<commit_message>
Added N button switch enforcement for top banner
</commit_message>
<xml_diff>
--- a/dsgn/GUI.pptx
+++ b/dsgn/GUI.pptx
@@ -110,6 +110,11 @@
     <p:ext uri="{EFAFB233-063F-42B5-8137-9DF3F51BA10A}">
       <p15:sldGuideLst xmlns:p15="http://schemas.microsoft.com/office/powerpoint/2012/main">
         <p15:guide id="1" pos="3840" userDrawn="1">
+          <p15:clr>
+            <a:srgbClr val="A4A3A4"/>
+          </p15:clr>
+        </p15:guide>
+        <p15:guide id="2" orient="horz" pos="2160">
           <p15:clr>
             <a:srgbClr val="A4A3A4"/>
           </p15:clr>

</xml_diff>

<commit_message>
Added force cal gui elements
</commit_message>
<xml_diff>
--- a/dsgn/GUI.pptx
+++ b/dsgn/GUI.pptx
@@ -8,6 +8,7 @@
     <p:sldId id="256" r:id="rId2"/>
     <p:sldId id="257" r:id="rId3"/>
     <p:sldId id="258" r:id="rId4"/>
+    <p:sldId id="259" r:id="rId5"/>
   </p:sldIdLst>
   <p:sldSz cx="12192000" cy="6858000"/>
   <p:notesSz cx="6858000" cy="9144000"/>
@@ -272,7 +273,7 @@
           <a:p>
             <a:fld id="{FD881196-7F73-4C61-9FC5-78A1CDF7A0F4}" type="datetimeFigureOut">
               <a:rPr lang="en-US" smtClean="0"/>
-              <a:t>6/24/2021</a:t>
+              <a:t>6/26/2021</a:t>
             </a:fld>
             <a:endParaRPr lang="en-US"/>
           </a:p>
@@ -470,7 +471,7 @@
           <a:p>
             <a:fld id="{FD881196-7F73-4C61-9FC5-78A1CDF7A0F4}" type="datetimeFigureOut">
               <a:rPr lang="en-US" smtClean="0"/>
-              <a:t>6/24/2021</a:t>
+              <a:t>6/26/2021</a:t>
             </a:fld>
             <a:endParaRPr lang="en-US"/>
           </a:p>
@@ -678,7 +679,7 @@
           <a:p>
             <a:fld id="{FD881196-7F73-4C61-9FC5-78A1CDF7A0F4}" type="datetimeFigureOut">
               <a:rPr lang="en-US" smtClean="0"/>
-              <a:t>6/24/2021</a:t>
+              <a:t>6/26/2021</a:t>
             </a:fld>
             <a:endParaRPr lang="en-US"/>
           </a:p>
@@ -876,7 +877,7 @@
           <a:p>
             <a:fld id="{FD881196-7F73-4C61-9FC5-78A1CDF7A0F4}" type="datetimeFigureOut">
               <a:rPr lang="en-US" smtClean="0"/>
-              <a:t>6/24/2021</a:t>
+              <a:t>6/26/2021</a:t>
             </a:fld>
             <a:endParaRPr lang="en-US"/>
           </a:p>
@@ -1151,7 +1152,7 @@
           <a:p>
             <a:fld id="{FD881196-7F73-4C61-9FC5-78A1CDF7A0F4}" type="datetimeFigureOut">
               <a:rPr lang="en-US" smtClean="0"/>
-              <a:t>6/24/2021</a:t>
+              <a:t>6/26/2021</a:t>
             </a:fld>
             <a:endParaRPr lang="en-US"/>
           </a:p>
@@ -1416,7 +1417,7 @@
           <a:p>
             <a:fld id="{FD881196-7F73-4C61-9FC5-78A1CDF7A0F4}" type="datetimeFigureOut">
               <a:rPr lang="en-US" smtClean="0"/>
-              <a:t>6/24/2021</a:t>
+              <a:t>6/26/2021</a:t>
             </a:fld>
             <a:endParaRPr lang="en-US"/>
           </a:p>
@@ -1828,7 +1829,7 @@
           <a:p>
             <a:fld id="{FD881196-7F73-4C61-9FC5-78A1CDF7A0F4}" type="datetimeFigureOut">
               <a:rPr lang="en-US" smtClean="0"/>
-              <a:t>6/24/2021</a:t>
+              <a:t>6/26/2021</a:t>
             </a:fld>
             <a:endParaRPr lang="en-US"/>
           </a:p>
@@ -1969,7 +1970,7 @@
           <a:p>
             <a:fld id="{FD881196-7F73-4C61-9FC5-78A1CDF7A0F4}" type="datetimeFigureOut">
               <a:rPr lang="en-US" smtClean="0"/>
-              <a:t>6/24/2021</a:t>
+              <a:t>6/26/2021</a:t>
             </a:fld>
             <a:endParaRPr lang="en-US"/>
           </a:p>
@@ -2082,7 +2083,7 @@
           <a:p>
             <a:fld id="{FD881196-7F73-4C61-9FC5-78A1CDF7A0F4}" type="datetimeFigureOut">
               <a:rPr lang="en-US" smtClean="0"/>
-              <a:t>6/24/2021</a:t>
+              <a:t>6/26/2021</a:t>
             </a:fld>
             <a:endParaRPr lang="en-US"/>
           </a:p>
@@ -2393,7 +2394,7 @@
           <a:p>
             <a:fld id="{FD881196-7F73-4C61-9FC5-78A1CDF7A0F4}" type="datetimeFigureOut">
               <a:rPr lang="en-US" smtClean="0"/>
-              <a:t>6/24/2021</a:t>
+              <a:t>6/26/2021</a:t>
             </a:fld>
             <a:endParaRPr lang="en-US"/>
           </a:p>
@@ -2681,7 +2682,7 @@
           <a:p>
             <a:fld id="{FD881196-7F73-4C61-9FC5-78A1CDF7A0F4}" type="datetimeFigureOut">
               <a:rPr lang="en-US" smtClean="0"/>
-              <a:t>6/24/2021</a:t>
+              <a:t>6/26/2021</a:t>
             </a:fld>
             <a:endParaRPr lang="en-US"/>
           </a:p>
@@ -2922,7 +2923,7 @@
           <a:p>
             <a:fld id="{FD881196-7F73-4C61-9FC5-78A1CDF7A0F4}" type="datetimeFigureOut">
               <a:rPr lang="en-US" smtClean="0"/>
-              <a:t>6/24/2021</a:t>
+              <a:t>6/26/2021</a:t>
             </a:fld>
             <a:endParaRPr lang="en-US"/>
           </a:p>
@@ -4372,6 +4373,372 @@
 </p:sld>
 </file>
 
+<file path=ppt/slides/slide4.xml><?xml version="1.0" encoding="utf-8"?>
+<p:sld xmlns:a="http://schemas.openxmlformats.org/drawingml/2006/main" xmlns:r="http://schemas.openxmlformats.org/officeDocument/2006/relationships" xmlns:p="http://schemas.openxmlformats.org/presentationml/2006/main">
+  <p:cSld>
+    <p:spTree>
+      <p:nvGrpSpPr>
+        <p:cNvPr id="1" name=""/>
+        <p:cNvGrpSpPr/>
+        <p:nvPr/>
+      </p:nvGrpSpPr>
+      <p:grpSpPr>
+        <a:xfrm>
+          <a:off x="0" y="0"/>
+          <a:ext cx="0" cy="0"/>
+          <a:chOff x="0" y="0"/>
+          <a:chExt cx="0" cy="0"/>
+        </a:xfrm>
+      </p:grpSpPr>
+      <p:sp>
+        <p:nvSpPr>
+          <p:cNvPr id="4" name="Rectangle 3">
+            <a:extLst>
+              <a:ext uri="{FF2B5EF4-FFF2-40B4-BE49-F238E27FC236}">
+                <a16:creationId xmlns:a16="http://schemas.microsoft.com/office/drawing/2014/main" id="{F43C9388-76BC-4703-A043-AF6E90F9005E}"/>
+              </a:ext>
+            </a:extLst>
+          </p:cNvPr>
+          <p:cNvSpPr/>
+          <p:nvPr/>
+        </p:nvSpPr>
+        <p:spPr>
+          <a:xfrm>
+            <a:off x="0" y="6395545"/>
+            <a:ext cx="12192000" cy="462455"/>
+          </a:xfrm>
+          <a:prstGeom prst="rect">
+            <a:avLst/>
+          </a:prstGeom>
+          <a:ln/>
+        </p:spPr>
+        <p:style>
+          <a:lnRef idx="2">
+            <a:schemeClr val="dk1"/>
+          </a:lnRef>
+          <a:fillRef idx="1">
+            <a:schemeClr val="lt1"/>
+          </a:fillRef>
+          <a:effectRef idx="0">
+            <a:schemeClr val="dk1"/>
+          </a:effectRef>
+          <a:fontRef idx="minor">
+            <a:schemeClr val="dk1"/>
+          </a:fontRef>
+        </p:style>
+        <p:txBody>
+          <a:bodyPr rtlCol="0" anchor="ctr"/>
+          <a:lstStyle/>
+          <a:p>
+            <a:pPr algn="ctr"/>
+            <a:r>
+              <a:rPr lang="en-US" dirty="0"/>
+              <a:t>Bottom Ribbon</a:t>
+            </a:r>
+          </a:p>
+        </p:txBody>
+      </p:sp>
+      <p:sp>
+        <p:nvSpPr>
+          <p:cNvPr id="5" name="Rectangle 4">
+            <a:extLst>
+              <a:ext uri="{FF2B5EF4-FFF2-40B4-BE49-F238E27FC236}">
+                <a16:creationId xmlns:a16="http://schemas.microsoft.com/office/drawing/2014/main" id="{BCA638DD-E348-4B84-8629-DAA3BB95D38C}"/>
+              </a:ext>
+            </a:extLst>
+          </p:cNvPr>
+          <p:cNvSpPr/>
+          <p:nvPr/>
+        </p:nvSpPr>
+        <p:spPr>
+          <a:xfrm>
+            <a:off x="0" y="998483"/>
+            <a:ext cx="1944414" cy="5397062"/>
+          </a:xfrm>
+          <a:prstGeom prst="rect">
+            <a:avLst/>
+          </a:prstGeom>
+          <a:ln/>
+        </p:spPr>
+        <p:style>
+          <a:lnRef idx="2">
+            <a:schemeClr val="dk1"/>
+          </a:lnRef>
+          <a:fillRef idx="1">
+            <a:schemeClr val="lt1"/>
+          </a:fillRef>
+          <a:effectRef idx="0">
+            <a:schemeClr val="dk1"/>
+          </a:effectRef>
+          <a:fontRef idx="minor">
+            <a:schemeClr val="dk1"/>
+          </a:fontRef>
+        </p:style>
+        <p:txBody>
+          <a:bodyPr rtlCol="0" anchor="ctr"/>
+          <a:lstStyle/>
+          <a:p>
+            <a:pPr algn="ctr"/>
+            <a:r>
+              <a:rPr lang="en-US" dirty="0"/>
+              <a:t>Static Controls</a:t>
+            </a:r>
+          </a:p>
+        </p:txBody>
+      </p:sp>
+      <p:sp>
+        <p:nvSpPr>
+          <p:cNvPr id="6" name="Rectangle 5">
+            <a:extLst>
+              <a:ext uri="{FF2B5EF4-FFF2-40B4-BE49-F238E27FC236}">
+                <a16:creationId xmlns:a16="http://schemas.microsoft.com/office/drawing/2014/main" id="{B123F2DF-F380-47D1-82ED-1F1D0D81D639}"/>
+              </a:ext>
+            </a:extLst>
+          </p:cNvPr>
+          <p:cNvSpPr/>
+          <p:nvPr/>
+        </p:nvSpPr>
+        <p:spPr>
+          <a:xfrm>
+            <a:off x="0" y="0"/>
+            <a:ext cx="12192000" cy="998483"/>
+          </a:xfrm>
+          <a:prstGeom prst="rect">
+            <a:avLst/>
+          </a:prstGeom>
+          <a:ln/>
+        </p:spPr>
+        <p:style>
+          <a:lnRef idx="2">
+            <a:schemeClr val="dk1"/>
+          </a:lnRef>
+          <a:fillRef idx="1">
+            <a:schemeClr val="lt1"/>
+          </a:fillRef>
+          <a:effectRef idx="0">
+            <a:schemeClr val="dk1"/>
+          </a:effectRef>
+          <a:fontRef idx="minor">
+            <a:schemeClr val="dk1"/>
+          </a:fontRef>
+        </p:style>
+        <p:txBody>
+          <a:bodyPr rtlCol="0" anchor="ctr"/>
+          <a:lstStyle/>
+          <a:p>
+            <a:pPr algn="ctr"/>
+            <a:r>
+              <a:rPr lang="en-US" dirty="0"/>
+              <a:t>Top Ribbon</a:t>
+            </a:r>
+          </a:p>
+        </p:txBody>
+      </p:sp>
+      <p:sp>
+        <p:nvSpPr>
+          <p:cNvPr id="7" name="Rectangle 6">
+            <a:extLst>
+              <a:ext uri="{FF2B5EF4-FFF2-40B4-BE49-F238E27FC236}">
+                <a16:creationId xmlns:a16="http://schemas.microsoft.com/office/drawing/2014/main" id="{74A0E340-73D4-48A1-91D5-C6E8E518E415}"/>
+              </a:ext>
+            </a:extLst>
+          </p:cNvPr>
+          <p:cNvSpPr/>
+          <p:nvPr/>
+        </p:nvSpPr>
+        <p:spPr>
+          <a:xfrm>
+            <a:off x="1944414" y="998483"/>
+            <a:ext cx="4035972" cy="2091558"/>
+          </a:xfrm>
+          <a:prstGeom prst="rect">
+            <a:avLst/>
+          </a:prstGeom>
+          <a:ln/>
+        </p:spPr>
+        <p:style>
+          <a:lnRef idx="2">
+            <a:schemeClr val="dk1"/>
+          </a:lnRef>
+          <a:fillRef idx="1">
+            <a:schemeClr val="lt1"/>
+          </a:fillRef>
+          <a:effectRef idx="0">
+            <a:schemeClr val="dk1"/>
+          </a:effectRef>
+          <a:fontRef idx="minor">
+            <a:schemeClr val="dk1"/>
+          </a:fontRef>
+        </p:style>
+        <p:txBody>
+          <a:bodyPr rtlCol="0" anchor="ctr"/>
+          <a:lstStyle/>
+          <a:p>
+            <a:pPr algn="ctr"/>
+            <a:r>
+              <a:rPr lang="en-US" dirty="0"/>
+              <a:t>Dynamic Controls</a:t>
+            </a:r>
+          </a:p>
+        </p:txBody>
+      </p:sp>
+      <p:sp>
+        <p:nvSpPr>
+          <p:cNvPr id="8" name="Rectangle 7">
+            <a:extLst>
+              <a:ext uri="{FF2B5EF4-FFF2-40B4-BE49-F238E27FC236}">
+                <a16:creationId xmlns:a16="http://schemas.microsoft.com/office/drawing/2014/main" id="{C2821C75-C509-4CD7-97AD-7655F6F82F27}"/>
+              </a:ext>
+            </a:extLst>
+          </p:cNvPr>
+          <p:cNvSpPr/>
+          <p:nvPr/>
+        </p:nvSpPr>
+        <p:spPr>
+          <a:xfrm>
+            <a:off x="5980386" y="998483"/>
+            <a:ext cx="6211614" cy="2769477"/>
+          </a:xfrm>
+          <a:prstGeom prst="rect">
+            <a:avLst/>
+          </a:prstGeom>
+          <a:ln/>
+        </p:spPr>
+        <p:style>
+          <a:lnRef idx="2">
+            <a:schemeClr val="dk1"/>
+          </a:lnRef>
+          <a:fillRef idx="1">
+            <a:schemeClr val="lt1"/>
+          </a:fillRef>
+          <a:effectRef idx="0">
+            <a:schemeClr val="dk1"/>
+          </a:effectRef>
+          <a:fontRef idx="minor">
+            <a:schemeClr val="dk1"/>
+          </a:fontRef>
+        </p:style>
+        <p:txBody>
+          <a:bodyPr rtlCol="0" anchor="ctr"/>
+          <a:lstStyle/>
+          <a:p>
+            <a:pPr algn="ctr"/>
+            <a:r>
+              <a:rPr lang="en-US" dirty="0"/>
+              <a:t>Force Chart</a:t>
+            </a:r>
+          </a:p>
+        </p:txBody>
+      </p:sp>
+      <p:sp>
+        <p:nvSpPr>
+          <p:cNvPr id="9" name="Rectangle 8">
+            <a:extLst>
+              <a:ext uri="{FF2B5EF4-FFF2-40B4-BE49-F238E27FC236}">
+                <a16:creationId xmlns:a16="http://schemas.microsoft.com/office/drawing/2014/main" id="{10151DE2-63D3-4FEB-A3CF-149F430AC4C9}"/>
+              </a:ext>
+            </a:extLst>
+          </p:cNvPr>
+          <p:cNvSpPr/>
+          <p:nvPr/>
+        </p:nvSpPr>
+        <p:spPr>
+          <a:xfrm>
+            <a:off x="5980386" y="3767960"/>
+            <a:ext cx="6211614" cy="2627585"/>
+          </a:xfrm>
+          <a:prstGeom prst="rect">
+            <a:avLst/>
+          </a:prstGeom>
+          <a:ln/>
+        </p:spPr>
+        <p:style>
+          <a:lnRef idx="2">
+            <a:schemeClr val="dk1"/>
+          </a:lnRef>
+          <a:fillRef idx="1">
+            <a:schemeClr val="lt1"/>
+          </a:fillRef>
+          <a:effectRef idx="0">
+            <a:schemeClr val="dk1"/>
+          </a:effectRef>
+          <a:fontRef idx="minor">
+            <a:schemeClr val="dk1"/>
+          </a:fontRef>
+        </p:style>
+        <p:txBody>
+          <a:bodyPr rtlCol="0" anchor="ctr"/>
+          <a:lstStyle/>
+          <a:p>
+            <a:pPr algn="ctr"/>
+            <a:r>
+              <a:rPr lang="en-US" dirty="0"/>
+              <a:t>Diameter Chart</a:t>
+            </a:r>
+          </a:p>
+        </p:txBody>
+      </p:sp>
+      <p:sp>
+        <p:nvSpPr>
+          <p:cNvPr id="10" name="Rectangle 9">
+            <a:extLst>
+              <a:ext uri="{FF2B5EF4-FFF2-40B4-BE49-F238E27FC236}">
+                <a16:creationId xmlns:a16="http://schemas.microsoft.com/office/drawing/2014/main" id="{B06008E5-E544-43E0-9BBE-346BA18ECE41}"/>
+              </a:ext>
+            </a:extLst>
+          </p:cNvPr>
+          <p:cNvSpPr/>
+          <p:nvPr/>
+        </p:nvSpPr>
+        <p:spPr>
+          <a:xfrm>
+            <a:off x="1944414" y="3090040"/>
+            <a:ext cx="4035972" cy="3305505"/>
+          </a:xfrm>
+          <a:prstGeom prst="rect">
+            <a:avLst/>
+          </a:prstGeom>
+          <a:ln/>
+        </p:spPr>
+        <p:style>
+          <a:lnRef idx="2">
+            <a:schemeClr val="dk1"/>
+          </a:lnRef>
+          <a:fillRef idx="1">
+            <a:schemeClr val="lt1"/>
+          </a:fillRef>
+          <a:effectRef idx="0">
+            <a:schemeClr val="dk1"/>
+          </a:effectRef>
+          <a:fontRef idx="minor">
+            <a:schemeClr val="dk1"/>
+          </a:fontRef>
+        </p:style>
+        <p:txBody>
+          <a:bodyPr rtlCol="0" anchor="ctr"/>
+          <a:lstStyle/>
+          <a:p>
+            <a:pPr algn="ctr"/>
+            <a:r>
+              <a:rPr lang="en-US" dirty="0"/>
+              <a:t>Camera</a:t>
+            </a:r>
+          </a:p>
+        </p:txBody>
+      </p:sp>
+    </p:spTree>
+    <p:extLst>
+      <p:ext uri="{BB962C8B-B14F-4D97-AF65-F5344CB8AC3E}">
+        <p14:creationId xmlns:p14="http://schemas.microsoft.com/office/powerpoint/2010/main" val="458201572"/>
+      </p:ext>
+    </p:extLst>
+  </p:cSld>
+  <p:clrMapOvr>
+    <a:masterClrMapping/>
+  </p:clrMapOvr>
+</p:sld>
+</file>
+
 <file path=ppt/theme/theme1.xml><?xml version="1.0" encoding="utf-8"?>
 <a:theme xmlns:a="http://schemas.openxmlformats.org/drawingml/2006/main" name="Office Theme">
   <a:themeElements>

</xml_diff>